<commit_message>
New slides till the end of verdict
</commit_message>
<xml_diff>
--- a/docs/Lupapiste Usage Data - 20150430.pptx
+++ b/docs/Lupapiste Usage Data - 20150430.pptx
@@ -10,6 +10,12 @@
     <p:sldId id="260" r:id="rId4"/>
     <p:sldId id="261" r:id="rId5"/>
     <p:sldId id="259" r:id="rId6"/>
+    <p:sldId id="262" r:id="rId7"/>
+    <p:sldId id="263" r:id="rId8"/>
+    <p:sldId id="264" r:id="rId9"/>
+    <p:sldId id="265" r:id="rId10"/>
+    <p:sldId id="266" r:id="rId11"/>
+    <p:sldId id="267" r:id="rId12"/>
   </p:sldIdLst>
   <p:sldSz cx="9144000" cy="5143500" type="screen16x9"/>
   <p:notesSz cx="6858000" cy="9144000"/>
@@ -110,7 +116,7 @@
   </p:defaultTextStyle>
   <p:extLst>
     <p:ext uri="{EFAFB233-063F-42B5-8137-9DF3F51BA10A}">
-      <p15:sldGuideLst xmlns:p15="http://schemas.microsoft.com/office/powerpoint/2012/main">
+      <p15:sldGuideLst xmlns:p15="http://schemas.microsoft.com/office/powerpoint/2012/main" xmlns="">
         <p15:guide id="1" orient="horz" pos="1620" userDrawn="1">
           <p15:clr>
             <a:srgbClr val="A4A3A4"/>
@@ -430,7 +436,7 @@
   </p:timing>
   <p:extLst mod="1">
     <p:ext uri="{DCECCB84-F9BA-43D5-87BE-67443E8EF086}">
-      <p15:sldGuideLst xmlns:p15="http://schemas.microsoft.com/office/powerpoint/2012/main">
+      <p15:sldGuideLst xmlns:p15="http://schemas.microsoft.com/office/powerpoint/2012/main" xmlns="">
         <p15:guide id="1" orient="horz" pos="1620">
           <p15:clr>
             <a:srgbClr val="FBAE40"/>
@@ -705,7 +711,7 @@
   </p:timing>
   <p:extLst>
     <p:ext uri="{DCECCB84-F9BA-43D5-87BE-67443E8EF086}">
-      <p15:sldGuideLst xmlns:p15="http://schemas.microsoft.com/office/powerpoint/2012/main"/>
+      <p15:sldGuideLst xmlns:p15="http://schemas.microsoft.com/office/powerpoint/2012/main" xmlns=""/>
     </p:ext>
   </p:extLst>
 </p:sldLayout>
@@ -1931,7 +1937,7 @@
   </p:timing>
   <p:extLst>
     <p:ext uri="{DCECCB84-F9BA-43D5-87BE-67443E8EF086}">
-      <p15:sldGuideLst xmlns:p15="http://schemas.microsoft.com/office/powerpoint/2012/main">
+      <p15:sldGuideLst xmlns:p15="http://schemas.microsoft.com/office/powerpoint/2012/main" xmlns="">
         <p15:guide id="1" orient="horz" pos="1620">
           <p15:clr>
             <a:srgbClr val="FBAE40"/>
@@ -3162,7 +3168,7 @@
   </p:timing>
   <p:extLst mod="1">
     <p:ext uri="{DCECCB84-F9BA-43D5-87BE-67443E8EF086}">
-      <p15:sldGuideLst xmlns:p15="http://schemas.microsoft.com/office/powerpoint/2012/main">
+      <p15:sldGuideLst xmlns:p15="http://schemas.microsoft.com/office/powerpoint/2012/main" xmlns="">
         <p15:guide id="1" orient="horz" pos="1620">
           <p15:clr>
             <a:srgbClr val="FBAE40"/>
@@ -3600,7 +3606,7 @@
   </p:timing>
   <p:extLst mod="1">
     <p:ext uri="{DCECCB84-F9BA-43D5-87BE-67443E8EF086}">
-      <p15:sldGuideLst xmlns:p15="http://schemas.microsoft.com/office/powerpoint/2012/main">
+      <p15:sldGuideLst xmlns:p15="http://schemas.microsoft.com/office/powerpoint/2012/main" xmlns="">
         <p15:guide id="1" orient="horz" pos="1620">
           <p15:clr>
             <a:srgbClr val="FBAE40"/>
@@ -4202,7 +4208,7 @@
   </p:timing>
   <p:extLst mod="1">
     <p:ext uri="{DCECCB84-F9BA-43D5-87BE-67443E8EF086}">
-      <p15:sldGuideLst xmlns:p15="http://schemas.microsoft.com/office/powerpoint/2012/main">
+      <p15:sldGuideLst xmlns:p15="http://schemas.microsoft.com/office/powerpoint/2012/main" xmlns="">
         <p15:guide id="1" orient="horz" pos="1620">
           <p15:clr>
             <a:srgbClr val="FBAE40"/>
@@ -4560,7 +4566,7 @@
   </p:timing>
   <p:extLst mod="1">
     <p:ext uri="{DCECCB84-F9BA-43D5-87BE-67443E8EF086}">
-      <p15:sldGuideLst xmlns:p15="http://schemas.microsoft.com/office/powerpoint/2012/main">
+      <p15:sldGuideLst xmlns:p15="http://schemas.microsoft.com/office/powerpoint/2012/main" xmlns="">
         <p15:guide id="1" orient="horz" pos="1620">
           <p15:clr>
             <a:srgbClr val="FBAE40"/>
@@ -4885,7 +4891,7 @@
   </p:timing>
   <p:extLst mod="1">
     <p:ext uri="{DCECCB84-F9BA-43D5-87BE-67443E8EF086}">
-      <p15:sldGuideLst xmlns:p15="http://schemas.microsoft.com/office/powerpoint/2012/main">
+      <p15:sldGuideLst xmlns:p15="http://schemas.microsoft.com/office/powerpoint/2012/main" xmlns="">
         <p15:guide id="1" orient="horz" pos="1620">
           <p15:clr>
             <a:srgbClr val="FBAE40"/>
@@ -5190,7 +5196,7 @@
   </p:timing>
   <p:extLst mod="1">
     <p:ext uri="{DCECCB84-F9BA-43D5-87BE-67443E8EF086}">
-      <p15:sldGuideLst xmlns:p15="http://schemas.microsoft.com/office/powerpoint/2012/main">
+      <p15:sldGuideLst xmlns:p15="http://schemas.microsoft.com/office/powerpoint/2012/main" xmlns="">
         <p15:guide id="1" orient="horz" pos="1620">
           <p15:clr>
             <a:srgbClr val="FBAE40"/>
@@ -5791,7 +5797,7 @@
   </p:timing>
   <p:extLst mod="1">
     <p:ext uri="{DCECCB84-F9BA-43D5-87BE-67443E8EF086}">
-      <p15:sldGuideLst xmlns:p15="http://schemas.microsoft.com/office/powerpoint/2012/main"/>
+      <p15:sldGuideLst xmlns:p15="http://schemas.microsoft.com/office/powerpoint/2012/main" xmlns=""/>
     </p:ext>
   </p:extLst>
 </p:sldLayout>
@@ -6355,7 +6361,7 @@
   </p:txStyles>
   <p:extLst mod="1">
     <p:ext uri="{27BBF7A9-308A-43DC-89C8-2F10F3537804}">
-      <p15:sldGuideLst xmlns:p15="http://schemas.microsoft.com/office/powerpoint/2012/main">
+      <p15:sldGuideLst xmlns:p15="http://schemas.microsoft.com/office/powerpoint/2012/main" xmlns="">
         <p15:guide id="1" orient="horz" pos="1620">
           <p15:clr>
             <a:srgbClr val="F26B43"/>
@@ -6486,6 +6492,402 @@
 </p:sld>
 </file>
 
+<file path=ppt/slides/slide10.xml><?xml version="1.0" encoding="utf-8"?>
+<p:sld xmlns:a="http://schemas.openxmlformats.org/drawingml/2006/main" xmlns:r="http://schemas.openxmlformats.org/officeDocument/2006/relationships" xmlns:p="http://schemas.openxmlformats.org/presentationml/2006/main">
+  <p:cSld>
+    <p:spTree>
+      <p:nvGrpSpPr>
+        <p:cNvPr id="1" name=""/>
+        <p:cNvGrpSpPr/>
+        <p:nvPr/>
+      </p:nvGrpSpPr>
+      <p:grpSpPr>
+        <a:xfrm>
+          <a:off x="0" y="0"/>
+          <a:ext cx="0" cy="0"/>
+          <a:chOff x="0" y="0"/>
+          <a:chExt cx="0" cy="0"/>
+        </a:xfrm>
+      </p:grpSpPr>
+      <p:pic>
+        <p:nvPicPr>
+          <p:cNvPr id="5122" name="Picture 2"/>
+          <p:cNvPicPr>
+            <a:picLocks noChangeAspect="1" noChangeArrowheads="1"/>
+          </p:cNvPicPr>
+          <p:nvPr/>
+        </p:nvPicPr>
+        <p:blipFill>
+          <a:blip r:embed="rId2">
+            <a:extLst>
+              <a:ext uri="{28A0092B-C50C-407E-A947-70E740481C1C}">
+                <a14:useLocalDpi xmlns:a14="http://schemas.microsoft.com/office/drawing/2010/main" val="0"/>
+              </a:ext>
+            </a:extLst>
+          </a:blip>
+          <a:srcRect/>
+          <a:stretch>
+            <a:fillRect/>
+          </a:stretch>
+        </p:blipFill>
+        <p:spPr bwMode="auto">
+          <a:xfrm>
+            <a:off x="1" y="0"/>
+            <a:ext cx="6612556" cy="4694791"/>
+          </a:xfrm>
+          <a:prstGeom prst="rect">
+            <a:avLst/>
+          </a:prstGeom>
+          <a:noFill/>
+          <a:ln>
+            <a:noFill/>
+          </a:ln>
+          <a:extLst>
+            <a:ext uri="{909E8E84-426E-40DD-AFC4-6F175D3DCCD1}">
+              <a14:hiddenFill xmlns:a14="http://schemas.microsoft.com/office/drawing/2010/main">
+                <a:solidFill>
+                  <a:schemeClr val="accent1"/>
+                </a:solidFill>
+              </a14:hiddenFill>
+            </a:ext>
+            <a:ext uri="{91240B29-F687-4F45-9708-019B960494DF}">
+              <a14:hiddenLine xmlns:a14="http://schemas.microsoft.com/office/drawing/2010/main" w="9525">
+                <a:solidFill>
+                  <a:schemeClr val="tx1"/>
+                </a:solidFill>
+                <a:miter lim="800000"/>
+                <a:headEnd/>
+                <a:tailEnd/>
+              </a14:hiddenLine>
+            </a:ext>
+          </a:extLst>
+        </p:spPr>
+      </p:pic>
+      <p:sp>
+        <p:nvSpPr>
+          <p:cNvPr id="4" name="TextBox 3"/>
+          <p:cNvSpPr txBox="1"/>
+          <p:nvPr/>
+        </p:nvSpPr>
+        <p:spPr>
+          <a:xfrm>
+            <a:off x="6939815" y="1395663"/>
+            <a:ext cx="1957587" cy="300082"/>
+          </a:xfrm>
+          <a:prstGeom prst="rect">
+            <a:avLst/>
+          </a:prstGeom>
+          <a:noFill/>
+        </p:spPr>
+        <p:txBody>
+          <a:bodyPr wrap="none" rtlCol="0">
+            <a:spAutoFit/>
+          </a:bodyPr>
+          <a:lstStyle/>
+          <a:p>
+            <a:r>
+              <a:rPr lang="en-US" dirty="0" err="1" smtClean="0"/>
+              <a:t>Hämmennyksen</a:t>
+            </a:r>
+            <a:r>
+              <a:rPr lang="en-US" dirty="0" smtClean="0"/>
+              <a:t> </a:t>
+            </a:r>
+            <a:r>
+              <a:rPr lang="en-US" dirty="0" err="1" smtClean="0"/>
+              <a:t>hetki</a:t>
+            </a:r>
+            <a:r>
+              <a:rPr lang="en-US" dirty="0" smtClean="0"/>
+              <a:t>?</a:t>
+            </a:r>
+            <a:endParaRPr lang="en-US" dirty="0"/>
+          </a:p>
+        </p:txBody>
+      </p:sp>
+    </p:spTree>
+    <p:extLst>
+      <p:ext uri="{BB962C8B-B14F-4D97-AF65-F5344CB8AC3E}">
+        <p14:creationId xmlns:p14="http://schemas.microsoft.com/office/powerpoint/2010/main" val="3493275259"/>
+      </p:ext>
+    </p:extLst>
+  </p:cSld>
+  <p:clrMapOvr>
+    <a:masterClrMapping/>
+  </p:clrMapOvr>
+</p:sld>
+</file>
+
+<file path=ppt/slides/slide11.xml><?xml version="1.0" encoding="utf-8"?>
+<p:sld xmlns:a="http://schemas.openxmlformats.org/drawingml/2006/main" xmlns:r="http://schemas.openxmlformats.org/officeDocument/2006/relationships" xmlns:p="http://schemas.openxmlformats.org/presentationml/2006/main">
+  <p:cSld>
+    <p:spTree>
+      <p:nvGrpSpPr>
+        <p:cNvPr id="1" name=""/>
+        <p:cNvGrpSpPr/>
+        <p:nvPr/>
+      </p:nvGrpSpPr>
+      <p:grpSpPr>
+        <a:xfrm>
+          <a:off x="0" y="0"/>
+          <a:ext cx="0" cy="0"/>
+          <a:chOff x="0" y="0"/>
+          <a:chExt cx="0" cy="0"/>
+        </a:xfrm>
+      </p:grpSpPr>
+      <p:pic>
+        <p:nvPicPr>
+          <p:cNvPr id="6147" name="Picture 3"/>
+          <p:cNvPicPr>
+            <a:picLocks noChangeAspect="1" noChangeArrowheads="1"/>
+          </p:cNvPicPr>
+          <p:nvPr/>
+        </p:nvPicPr>
+        <p:blipFill>
+          <a:blip r:embed="rId2">
+            <a:extLst>
+              <a:ext uri="{28A0092B-C50C-407E-A947-70E740481C1C}">
+                <a14:useLocalDpi xmlns:a14="http://schemas.microsoft.com/office/drawing/2010/main" val="0"/>
+              </a:ext>
+            </a:extLst>
+          </a:blip>
+          <a:srcRect/>
+          <a:stretch>
+            <a:fillRect/>
+          </a:stretch>
+        </p:blipFill>
+        <p:spPr bwMode="auto">
+          <a:xfrm>
+            <a:off x="130142" y="244393"/>
+            <a:ext cx="8150612" cy="3990724"/>
+          </a:xfrm>
+          <a:prstGeom prst="rect">
+            <a:avLst/>
+          </a:prstGeom>
+          <a:noFill/>
+          <a:ln>
+            <a:noFill/>
+          </a:ln>
+          <a:extLst>
+            <a:ext uri="{909E8E84-426E-40DD-AFC4-6F175D3DCCD1}">
+              <a14:hiddenFill xmlns:a14="http://schemas.microsoft.com/office/drawing/2010/main">
+                <a:solidFill>
+                  <a:schemeClr val="accent1"/>
+                </a:solidFill>
+              </a14:hiddenFill>
+            </a:ext>
+            <a:ext uri="{91240B29-F687-4F45-9708-019B960494DF}">
+              <a14:hiddenLine xmlns:a14="http://schemas.microsoft.com/office/drawing/2010/main" w="9525">
+                <a:solidFill>
+                  <a:schemeClr val="tx1"/>
+                </a:solidFill>
+                <a:miter lim="800000"/>
+                <a:headEnd/>
+                <a:tailEnd/>
+              </a14:hiddenLine>
+            </a:ext>
+          </a:extLst>
+        </p:spPr>
+      </p:pic>
+      <p:sp>
+        <p:nvSpPr>
+          <p:cNvPr id="6" name="Oval 5"/>
+          <p:cNvSpPr/>
+          <p:nvPr/>
+        </p:nvSpPr>
+        <p:spPr>
+          <a:xfrm>
+            <a:off x="3877376" y="2156058"/>
+            <a:ext cx="1917032" cy="266127"/>
+          </a:xfrm>
+          <a:prstGeom prst="ellipse">
+            <a:avLst/>
+          </a:prstGeom>
+          <a:noFill/>
+          <a:ln w="28575">
+            <a:solidFill>
+              <a:srgbClr val="FF0000"/>
+            </a:solidFill>
+          </a:ln>
+        </p:spPr>
+        <p:style>
+          <a:lnRef idx="2">
+            <a:schemeClr val="accent1">
+              <a:shade val="50000"/>
+            </a:schemeClr>
+          </a:lnRef>
+          <a:fillRef idx="1">
+            <a:schemeClr val="accent1"/>
+          </a:fillRef>
+          <a:effectRef idx="0">
+            <a:schemeClr val="accent1"/>
+          </a:effectRef>
+          <a:fontRef idx="minor">
+            <a:schemeClr val="lt1"/>
+          </a:fontRef>
+        </p:style>
+        <p:txBody>
+          <a:bodyPr rtlCol="0" anchor="ctr"/>
+          <a:lstStyle/>
+          <a:p>
+            <a:pPr algn="ctr"/>
+            <a:endParaRPr lang="en-US" sz="1600" dirty="0" err="1" smtClean="0"/>
+          </a:p>
+        </p:txBody>
+      </p:sp>
+      <p:sp>
+        <p:nvSpPr>
+          <p:cNvPr id="7" name="Oval 6"/>
+          <p:cNvSpPr/>
+          <p:nvPr/>
+        </p:nvSpPr>
+        <p:spPr>
+          <a:xfrm>
+            <a:off x="4291262" y="2531443"/>
+            <a:ext cx="1233639" cy="263625"/>
+          </a:xfrm>
+          <a:prstGeom prst="ellipse">
+            <a:avLst/>
+          </a:prstGeom>
+          <a:noFill/>
+          <a:ln w="28575">
+            <a:solidFill>
+              <a:srgbClr val="FF0000"/>
+            </a:solidFill>
+          </a:ln>
+        </p:spPr>
+        <p:style>
+          <a:lnRef idx="2">
+            <a:schemeClr val="accent1">
+              <a:shade val="50000"/>
+            </a:schemeClr>
+          </a:lnRef>
+          <a:fillRef idx="1">
+            <a:schemeClr val="accent1"/>
+          </a:fillRef>
+          <a:effectRef idx="0">
+            <a:schemeClr val="accent1"/>
+          </a:effectRef>
+          <a:fontRef idx="minor">
+            <a:schemeClr val="lt1"/>
+          </a:fontRef>
+        </p:style>
+        <p:txBody>
+          <a:bodyPr rtlCol="0" anchor="ctr"/>
+          <a:lstStyle/>
+          <a:p>
+            <a:pPr algn="ctr"/>
+            <a:endParaRPr lang="en-US" sz="1600" dirty="0" err="1" smtClean="0"/>
+          </a:p>
+        </p:txBody>
+      </p:sp>
+      <p:sp>
+        <p:nvSpPr>
+          <p:cNvPr id="4" name="TextBox 3"/>
+          <p:cNvSpPr txBox="1"/>
+          <p:nvPr/>
+        </p:nvSpPr>
+        <p:spPr>
+          <a:xfrm>
+            <a:off x="221379" y="4244743"/>
+            <a:ext cx="7738713" cy="300082"/>
+          </a:xfrm>
+          <a:prstGeom prst="rect">
+            <a:avLst/>
+          </a:prstGeom>
+          <a:noFill/>
+        </p:spPr>
+        <p:txBody>
+          <a:bodyPr wrap="square" rtlCol="0">
+            <a:spAutoFit/>
+          </a:bodyPr>
+          <a:lstStyle/>
+          <a:p>
+            <a:r>
+              <a:rPr lang="en-US" dirty="0" err="1" smtClean="0"/>
+              <a:t>Hakemus</a:t>
+            </a:r>
+            <a:r>
+              <a:rPr lang="en-US" dirty="0" smtClean="0"/>
+              <a:t> </a:t>
+            </a:r>
+            <a:r>
+              <a:rPr lang="en-US" dirty="0" err="1" smtClean="0"/>
+              <a:t>siis</a:t>
+            </a:r>
+            <a:r>
+              <a:rPr lang="en-US" dirty="0" smtClean="0"/>
+              <a:t> </a:t>
+            </a:r>
+            <a:r>
+              <a:rPr lang="en-US" dirty="0" err="1" smtClean="0"/>
+              <a:t>saa</a:t>
+            </a:r>
+            <a:r>
+              <a:rPr lang="en-US" dirty="0" smtClean="0"/>
+              <a:t> </a:t>
+            </a:r>
+            <a:r>
+              <a:rPr lang="en-US" dirty="0" err="1" smtClean="0"/>
+              <a:t>lopulta</a:t>
+            </a:r>
+            <a:r>
+              <a:rPr lang="en-US" dirty="0" smtClean="0"/>
+              <a:t> </a:t>
+            </a:r>
+            <a:r>
+              <a:rPr lang="en-US" dirty="0" err="1" smtClean="0"/>
+              <a:t>päätöksensä</a:t>
+            </a:r>
+            <a:r>
+              <a:rPr lang="en-US" dirty="0" smtClean="0"/>
+              <a:t> ja se </a:t>
+            </a:r>
+            <a:r>
+              <a:rPr lang="en-US" dirty="0" err="1" smtClean="0"/>
+              <a:t>voidaan</a:t>
+            </a:r>
+            <a:r>
+              <a:rPr lang="en-US" dirty="0" smtClean="0"/>
+              <a:t> </a:t>
+            </a:r>
+            <a:r>
+              <a:rPr lang="en-US" dirty="0" err="1" smtClean="0"/>
+              <a:t>ottaa</a:t>
+            </a:r>
+            <a:r>
+              <a:rPr lang="en-US" dirty="0" smtClean="0"/>
+              <a:t> </a:t>
+            </a:r>
+            <a:r>
+              <a:rPr lang="en-US" dirty="0" err="1" smtClean="0"/>
+              <a:t>mukaan</a:t>
+            </a:r>
+            <a:r>
+              <a:rPr lang="en-US" dirty="0" smtClean="0"/>
+              <a:t> </a:t>
+            </a:r>
+            <a:r>
+              <a:rPr lang="en-US" dirty="0" err="1" smtClean="0"/>
+              <a:t>tarkastelujoukkoon</a:t>
+            </a:r>
+            <a:endParaRPr lang="en-US" dirty="0"/>
+          </a:p>
+        </p:txBody>
+      </p:sp>
+    </p:spTree>
+    <p:extLst>
+      <p:ext uri="{BB962C8B-B14F-4D97-AF65-F5344CB8AC3E}">
+        <p14:creationId xmlns:p14="http://schemas.microsoft.com/office/powerpoint/2010/main" val="1340531100"/>
+      </p:ext>
+    </p:extLst>
+  </p:cSld>
+  <p:clrMapOvr>
+    <a:masterClrMapping/>
+  </p:clrMapOvr>
+</p:sld>
+</file>
+
 <file path=ppt/slides/slide2.xml><?xml version="1.0" encoding="utf-8"?>
 <p:sld xmlns:a="http://schemas.openxmlformats.org/drawingml/2006/main" xmlns:r="http://schemas.openxmlformats.org/officeDocument/2006/relationships" xmlns:p="http://schemas.openxmlformats.org/presentationml/2006/main">
   <p:cSld>
@@ -6936,6 +7338,1003 @@
       </p:par>
     </p:tnLst>
   </p:timing>
+</p:sld>
+</file>
+
+<file path=ppt/slides/slide6.xml><?xml version="1.0" encoding="utf-8"?>
+<p:sld xmlns:a="http://schemas.openxmlformats.org/drawingml/2006/main" xmlns:r="http://schemas.openxmlformats.org/officeDocument/2006/relationships" xmlns:p="http://schemas.openxmlformats.org/presentationml/2006/main">
+  <p:cSld>
+    <p:spTree>
+      <p:nvGrpSpPr>
+        <p:cNvPr id="1" name=""/>
+        <p:cNvGrpSpPr/>
+        <p:nvPr/>
+      </p:nvGrpSpPr>
+      <p:grpSpPr>
+        <a:xfrm>
+          <a:off x="0" y="0"/>
+          <a:ext cx="0" cy="0"/>
+          <a:chOff x="0" y="0"/>
+          <a:chExt cx="0" cy="0"/>
+        </a:xfrm>
+      </p:grpSpPr>
+      <p:pic>
+        <p:nvPicPr>
+          <p:cNvPr id="1026" name="Picture 2"/>
+          <p:cNvPicPr>
+            <a:picLocks noChangeAspect="1" noChangeArrowheads="1"/>
+          </p:cNvPicPr>
+          <p:nvPr/>
+        </p:nvPicPr>
+        <p:blipFill>
+          <a:blip r:embed="rId2">
+            <a:extLst>
+              <a:ext uri="{28A0092B-C50C-407E-A947-70E740481C1C}">
+                <a14:useLocalDpi xmlns:a14="http://schemas.microsoft.com/office/drawing/2010/main" val="0"/>
+              </a:ext>
+            </a:extLst>
+          </a:blip>
+          <a:srcRect/>
+          <a:stretch>
+            <a:fillRect/>
+          </a:stretch>
+        </p:blipFill>
+        <p:spPr bwMode="auto">
+          <a:xfrm>
+            <a:off x="0" y="1"/>
+            <a:ext cx="7141945" cy="3158626"/>
+          </a:xfrm>
+          <a:prstGeom prst="rect">
+            <a:avLst/>
+          </a:prstGeom>
+          <a:noFill/>
+          <a:ln>
+            <a:noFill/>
+          </a:ln>
+          <a:extLst>
+            <a:ext uri="{909E8E84-426E-40DD-AFC4-6F175D3DCCD1}">
+              <a14:hiddenFill xmlns:a14="http://schemas.microsoft.com/office/drawing/2010/main">
+                <a:solidFill>
+                  <a:schemeClr val="accent1"/>
+                </a:solidFill>
+              </a14:hiddenFill>
+            </a:ext>
+            <a:ext uri="{91240B29-F687-4F45-9708-019B960494DF}">
+              <a14:hiddenLine xmlns:a14="http://schemas.microsoft.com/office/drawing/2010/main" w="9525">
+                <a:solidFill>
+                  <a:schemeClr val="tx1"/>
+                </a:solidFill>
+                <a:miter lim="800000"/>
+                <a:headEnd/>
+                <a:tailEnd/>
+              </a14:hiddenLine>
+            </a:ext>
+          </a:extLst>
+        </p:spPr>
+      </p:pic>
+      <p:pic>
+        <p:nvPicPr>
+          <p:cNvPr id="1028" name="Picture 4"/>
+          <p:cNvPicPr>
+            <a:picLocks noChangeAspect="1" noChangeArrowheads="1"/>
+          </p:cNvPicPr>
+          <p:nvPr/>
+        </p:nvPicPr>
+        <p:blipFill>
+          <a:blip r:embed="rId3">
+            <a:extLst>
+              <a:ext uri="{28A0092B-C50C-407E-A947-70E740481C1C}">
+                <a14:useLocalDpi xmlns:a14="http://schemas.microsoft.com/office/drawing/2010/main" val="0"/>
+              </a:ext>
+            </a:extLst>
+          </a:blip>
+          <a:srcRect/>
+          <a:stretch>
+            <a:fillRect/>
+          </a:stretch>
+        </p:blipFill>
+        <p:spPr bwMode="auto">
+          <a:xfrm>
+            <a:off x="2714324" y="1744422"/>
+            <a:ext cx="5958540" cy="3316600"/>
+          </a:xfrm>
+          <a:prstGeom prst="rect">
+            <a:avLst/>
+          </a:prstGeom>
+          <a:noFill/>
+          <a:ln>
+            <a:noFill/>
+          </a:ln>
+          <a:extLst>
+            <a:ext uri="{909E8E84-426E-40DD-AFC4-6F175D3DCCD1}">
+              <a14:hiddenFill xmlns:a14="http://schemas.microsoft.com/office/drawing/2010/main">
+                <a:solidFill>
+                  <a:schemeClr val="accent1"/>
+                </a:solidFill>
+              </a14:hiddenFill>
+            </a:ext>
+            <a:ext uri="{91240B29-F687-4F45-9708-019B960494DF}">
+              <a14:hiddenLine xmlns:a14="http://schemas.microsoft.com/office/drawing/2010/main" w="9525">
+                <a:solidFill>
+                  <a:schemeClr val="tx1"/>
+                </a:solidFill>
+                <a:miter lim="800000"/>
+                <a:headEnd/>
+                <a:tailEnd/>
+              </a14:hiddenLine>
+            </a:ext>
+          </a:extLst>
+        </p:spPr>
+      </p:pic>
+      <p:cxnSp>
+        <p:nvCxnSpPr>
+          <p:cNvPr id="7" name="Straight Connector 6"/>
+          <p:cNvCxnSpPr/>
+          <p:nvPr/>
+        </p:nvCxnSpPr>
+        <p:spPr>
+          <a:xfrm flipH="1" flipV="1">
+            <a:off x="5977288" y="1579314"/>
+            <a:ext cx="702645" cy="1221638"/>
+          </a:xfrm>
+          <a:prstGeom prst="line">
+            <a:avLst/>
+          </a:prstGeom>
+          <a:ln w="28575"/>
+        </p:spPr>
+        <p:style>
+          <a:lnRef idx="1">
+            <a:schemeClr val="accent1"/>
+          </a:lnRef>
+          <a:fillRef idx="0">
+            <a:schemeClr val="accent1"/>
+          </a:fillRef>
+          <a:effectRef idx="0">
+            <a:schemeClr val="accent1"/>
+          </a:effectRef>
+          <a:fontRef idx="minor">
+            <a:schemeClr val="tx1"/>
+          </a:fontRef>
+        </p:style>
+      </p:cxnSp>
+      <p:sp>
+        <p:nvSpPr>
+          <p:cNvPr id="11" name="Oval 10"/>
+          <p:cNvSpPr/>
+          <p:nvPr/>
+        </p:nvSpPr>
+        <p:spPr>
+          <a:xfrm>
+            <a:off x="5106452" y="898"/>
+            <a:ext cx="1222157" cy="364862"/>
+          </a:xfrm>
+          <a:prstGeom prst="ellipse">
+            <a:avLst/>
+          </a:prstGeom>
+          <a:noFill/>
+          <a:ln w="28575">
+            <a:solidFill>
+              <a:srgbClr val="FF0000"/>
+            </a:solidFill>
+          </a:ln>
+        </p:spPr>
+        <p:style>
+          <a:lnRef idx="2">
+            <a:schemeClr val="accent1">
+              <a:shade val="50000"/>
+            </a:schemeClr>
+          </a:lnRef>
+          <a:fillRef idx="1">
+            <a:schemeClr val="accent1"/>
+          </a:fillRef>
+          <a:effectRef idx="0">
+            <a:schemeClr val="accent1"/>
+          </a:effectRef>
+          <a:fontRef idx="minor">
+            <a:schemeClr val="lt1"/>
+          </a:fontRef>
+        </p:style>
+        <p:txBody>
+          <a:bodyPr rtlCol="0" anchor="ctr"/>
+          <a:lstStyle/>
+          <a:p>
+            <a:pPr algn="ctr"/>
+            <a:endParaRPr lang="en-US" sz="1600" dirty="0" err="1" smtClean="0"/>
+          </a:p>
+        </p:txBody>
+      </p:sp>
+    </p:spTree>
+    <p:extLst>
+      <p:ext uri="{BB962C8B-B14F-4D97-AF65-F5344CB8AC3E}">
+        <p14:creationId xmlns:p14="http://schemas.microsoft.com/office/powerpoint/2010/main" val="1437981375"/>
+      </p:ext>
+    </p:extLst>
+  </p:cSld>
+  <p:clrMapOvr>
+    <a:masterClrMapping/>
+  </p:clrMapOvr>
+</p:sld>
+</file>
+
+<file path=ppt/slides/slide7.xml><?xml version="1.0" encoding="utf-8"?>
+<p:sld xmlns:a="http://schemas.openxmlformats.org/drawingml/2006/main" xmlns:r="http://schemas.openxmlformats.org/officeDocument/2006/relationships" xmlns:p="http://schemas.openxmlformats.org/presentationml/2006/main">
+  <p:cSld>
+    <p:spTree>
+      <p:nvGrpSpPr>
+        <p:cNvPr id="1" name=""/>
+        <p:cNvGrpSpPr/>
+        <p:nvPr/>
+      </p:nvGrpSpPr>
+      <p:grpSpPr>
+        <a:xfrm>
+          <a:off x="0" y="0"/>
+          <a:ext cx="0" cy="0"/>
+          <a:chOff x="0" y="0"/>
+          <a:chExt cx="0" cy="0"/>
+        </a:xfrm>
+      </p:grpSpPr>
+      <p:pic>
+        <p:nvPicPr>
+          <p:cNvPr id="2050" name="Picture 2"/>
+          <p:cNvPicPr>
+            <a:picLocks noChangeAspect="1" noChangeArrowheads="1"/>
+          </p:cNvPicPr>
+          <p:nvPr/>
+        </p:nvPicPr>
+        <p:blipFill>
+          <a:blip r:embed="rId2">
+            <a:extLst>
+              <a:ext uri="{28A0092B-C50C-407E-A947-70E740481C1C}">
+                <a14:useLocalDpi xmlns:a14="http://schemas.microsoft.com/office/drawing/2010/main" val="0"/>
+              </a:ext>
+            </a:extLst>
+          </a:blip>
+          <a:srcRect/>
+          <a:stretch>
+            <a:fillRect/>
+          </a:stretch>
+        </p:blipFill>
+        <p:spPr bwMode="auto">
+          <a:xfrm>
+            <a:off x="0" y="898"/>
+            <a:ext cx="7339388" cy="5142602"/>
+          </a:xfrm>
+          <a:prstGeom prst="rect">
+            <a:avLst/>
+          </a:prstGeom>
+          <a:noFill/>
+          <a:ln>
+            <a:noFill/>
+          </a:ln>
+          <a:extLst>
+            <a:ext uri="{909E8E84-426E-40DD-AFC4-6F175D3DCCD1}">
+              <a14:hiddenFill xmlns:a14="http://schemas.microsoft.com/office/drawing/2010/main">
+                <a:solidFill>
+                  <a:schemeClr val="accent1"/>
+                </a:solidFill>
+              </a14:hiddenFill>
+            </a:ext>
+            <a:ext uri="{91240B29-F687-4F45-9708-019B960494DF}">
+              <a14:hiddenLine xmlns:a14="http://schemas.microsoft.com/office/drawing/2010/main" w="9525">
+                <a:solidFill>
+                  <a:schemeClr val="tx1"/>
+                </a:solidFill>
+                <a:miter lim="800000"/>
+                <a:headEnd/>
+                <a:tailEnd/>
+              </a14:hiddenLine>
+            </a:ext>
+          </a:extLst>
+        </p:spPr>
+      </p:pic>
+      <p:pic>
+        <p:nvPicPr>
+          <p:cNvPr id="2051" name="Picture 3"/>
+          <p:cNvPicPr>
+            <a:picLocks noChangeAspect="1" noChangeArrowheads="1"/>
+          </p:cNvPicPr>
+          <p:nvPr/>
+        </p:nvPicPr>
+        <p:blipFill>
+          <a:blip r:embed="rId3">
+            <a:extLst>
+              <a:ext uri="{28A0092B-C50C-407E-A947-70E740481C1C}">
+                <a14:useLocalDpi xmlns:a14="http://schemas.microsoft.com/office/drawing/2010/main" val="0"/>
+              </a:ext>
+            </a:extLst>
+          </a:blip>
+          <a:srcRect/>
+          <a:stretch>
+            <a:fillRect/>
+          </a:stretch>
+        </p:blipFill>
+        <p:spPr bwMode="auto">
+          <a:xfrm>
+            <a:off x="1855690" y="956889"/>
+            <a:ext cx="7192058" cy="3230620"/>
+          </a:xfrm>
+          <a:prstGeom prst="rect">
+            <a:avLst/>
+          </a:prstGeom>
+          <a:noFill/>
+          <a:ln>
+            <a:noFill/>
+          </a:ln>
+          <a:extLst>
+            <a:ext uri="{909E8E84-426E-40DD-AFC4-6F175D3DCCD1}">
+              <a14:hiddenFill xmlns:a14="http://schemas.microsoft.com/office/drawing/2010/main">
+                <a:solidFill>
+                  <a:schemeClr val="accent1"/>
+                </a:solidFill>
+              </a14:hiddenFill>
+            </a:ext>
+            <a:ext uri="{91240B29-F687-4F45-9708-019B960494DF}">
+              <a14:hiddenLine xmlns:a14="http://schemas.microsoft.com/office/drawing/2010/main" w="9525">
+                <a:solidFill>
+                  <a:schemeClr val="tx1"/>
+                </a:solidFill>
+                <a:miter lim="800000"/>
+                <a:headEnd/>
+                <a:tailEnd/>
+              </a14:hiddenLine>
+            </a:ext>
+          </a:extLst>
+        </p:spPr>
+      </p:pic>
+      <p:sp>
+        <p:nvSpPr>
+          <p:cNvPr id="4" name="Oval 3"/>
+          <p:cNvSpPr/>
+          <p:nvPr/>
+        </p:nvSpPr>
+        <p:spPr>
+          <a:xfrm>
+            <a:off x="5881036" y="898"/>
+            <a:ext cx="548640" cy="364862"/>
+          </a:xfrm>
+          <a:prstGeom prst="ellipse">
+            <a:avLst/>
+          </a:prstGeom>
+          <a:noFill/>
+          <a:ln w="28575">
+            <a:solidFill>
+              <a:srgbClr val="FF0000"/>
+            </a:solidFill>
+          </a:ln>
+        </p:spPr>
+        <p:style>
+          <a:lnRef idx="2">
+            <a:schemeClr val="accent1">
+              <a:shade val="50000"/>
+            </a:schemeClr>
+          </a:lnRef>
+          <a:fillRef idx="1">
+            <a:schemeClr val="accent1"/>
+          </a:fillRef>
+          <a:effectRef idx="0">
+            <a:schemeClr val="accent1"/>
+          </a:effectRef>
+          <a:fontRef idx="minor">
+            <a:schemeClr val="lt1"/>
+          </a:fontRef>
+        </p:style>
+        <p:txBody>
+          <a:bodyPr rtlCol="0" anchor="ctr"/>
+          <a:lstStyle/>
+          <a:p>
+            <a:pPr algn="ctr"/>
+            <a:endParaRPr lang="en-US" sz="1600" dirty="0" err="1" smtClean="0"/>
+          </a:p>
+        </p:txBody>
+      </p:sp>
+      <p:sp>
+        <p:nvSpPr>
+          <p:cNvPr id="7" name="Oval 6"/>
+          <p:cNvSpPr/>
+          <p:nvPr/>
+        </p:nvSpPr>
+        <p:spPr>
+          <a:xfrm>
+            <a:off x="4570395" y="153298"/>
+            <a:ext cx="881323" cy="364862"/>
+          </a:xfrm>
+          <a:prstGeom prst="ellipse">
+            <a:avLst/>
+          </a:prstGeom>
+          <a:noFill/>
+          <a:ln w="28575">
+            <a:solidFill>
+              <a:srgbClr val="FF0000"/>
+            </a:solidFill>
+          </a:ln>
+        </p:spPr>
+        <p:style>
+          <a:lnRef idx="2">
+            <a:schemeClr val="accent1">
+              <a:shade val="50000"/>
+            </a:schemeClr>
+          </a:lnRef>
+          <a:fillRef idx="1">
+            <a:schemeClr val="accent1"/>
+          </a:fillRef>
+          <a:effectRef idx="0">
+            <a:schemeClr val="accent1"/>
+          </a:effectRef>
+          <a:fontRef idx="minor">
+            <a:schemeClr val="lt1"/>
+          </a:fontRef>
+        </p:style>
+        <p:txBody>
+          <a:bodyPr rtlCol="0" anchor="ctr"/>
+          <a:lstStyle/>
+          <a:p>
+            <a:pPr algn="ctr"/>
+            <a:endParaRPr lang="en-US" sz="1600" dirty="0" err="1" smtClean="0"/>
+          </a:p>
+        </p:txBody>
+      </p:sp>
+      <p:sp>
+        <p:nvSpPr>
+          <p:cNvPr id="8" name="Oval 7"/>
+          <p:cNvSpPr/>
+          <p:nvPr/>
+        </p:nvSpPr>
+        <p:spPr>
+          <a:xfrm>
+            <a:off x="3669694" y="2572199"/>
+            <a:ext cx="690550" cy="267254"/>
+          </a:xfrm>
+          <a:prstGeom prst="ellipse">
+            <a:avLst/>
+          </a:prstGeom>
+          <a:noFill/>
+          <a:ln w="28575">
+            <a:solidFill>
+              <a:srgbClr val="FF0000"/>
+            </a:solidFill>
+          </a:ln>
+        </p:spPr>
+        <p:style>
+          <a:lnRef idx="2">
+            <a:schemeClr val="accent1">
+              <a:shade val="50000"/>
+            </a:schemeClr>
+          </a:lnRef>
+          <a:fillRef idx="1">
+            <a:schemeClr val="accent1"/>
+          </a:fillRef>
+          <a:effectRef idx="0">
+            <a:schemeClr val="accent1"/>
+          </a:effectRef>
+          <a:fontRef idx="minor">
+            <a:schemeClr val="lt1"/>
+          </a:fontRef>
+        </p:style>
+        <p:txBody>
+          <a:bodyPr rtlCol="0" anchor="ctr"/>
+          <a:lstStyle/>
+          <a:p>
+            <a:pPr algn="ctr"/>
+            <a:endParaRPr lang="en-US" sz="1600" dirty="0" err="1" smtClean="0"/>
+          </a:p>
+        </p:txBody>
+      </p:sp>
+      <p:sp>
+        <p:nvSpPr>
+          <p:cNvPr id="9" name="Oval 8"/>
+          <p:cNvSpPr/>
+          <p:nvPr/>
+        </p:nvSpPr>
+        <p:spPr>
+          <a:xfrm>
+            <a:off x="5337209" y="2474591"/>
+            <a:ext cx="1333098" cy="364862"/>
+          </a:xfrm>
+          <a:prstGeom prst="ellipse">
+            <a:avLst/>
+          </a:prstGeom>
+          <a:noFill/>
+          <a:ln w="28575">
+            <a:solidFill>
+              <a:srgbClr val="FF0000"/>
+            </a:solidFill>
+          </a:ln>
+        </p:spPr>
+        <p:style>
+          <a:lnRef idx="2">
+            <a:schemeClr val="accent1">
+              <a:shade val="50000"/>
+            </a:schemeClr>
+          </a:lnRef>
+          <a:fillRef idx="1">
+            <a:schemeClr val="accent1"/>
+          </a:fillRef>
+          <a:effectRef idx="0">
+            <a:schemeClr val="accent1"/>
+          </a:effectRef>
+          <a:fontRef idx="minor">
+            <a:schemeClr val="lt1"/>
+          </a:fontRef>
+        </p:style>
+        <p:txBody>
+          <a:bodyPr rtlCol="0" anchor="ctr"/>
+          <a:lstStyle/>
+          <a:p>
+            <a:pPr algn="ctr"/>
+            <a:endParaRPr lang="en-US" sz="1600" dirty="0" err="1" smtClean="0"/>
+          </a:p>
+        </p:txBody>
+      </p:sp>
+      <p:cxnSp>
+        <p:nvCxnSpPr>
+          <p:cNvPr id="6" name="Straight Connector 5"/>
+          <p:cNvCxnSpPr>
+            <a:stCxn id="4" idx="4"/>
+            <a:endCxn id="8" idx="7"/>
+          </p:cNvCxnSpPr>
+          <p:nvPr/>
+        </p:nvCxnSpPr>
+        <p:spPr>
+          <a:xfrm flipH="1">
+            <a:off x="4259115" y="365760"/>
+            <a:ext cx="1896241" cy="2245577"/>
+          </a:xfrm>
+          <a:prstGeom prst="line">
+            <a:avLst/>
+          </a:prstGeom>
+          <a:ln w="28575"/>
+        </p:spPr>
+        <p:style>
+          <a:lnRef idx="1">
+            <a:schemeClr val="accent1"/>
+          </a:lnRef>
+          <a:fillRef idx="0">
+            <a:schemeClr val="accent1"/>
+          </a:fillRef>
+          <a:effectRef idx="0">
+            <a:schemeClr val="accent1"/>
+          </a:effectRef>
+          <a:fontRef idx="minor">
+            <a:schemeClr val="tx1"/>
+          </a:fontRef>
+        </p:style>
+      </p:cxnSp>
+      <p:cxnSp>
+        <p:nvCxnSpPr>
+          <p:cNvPr id="14" name="Straight Connector 13"/>
+          <p:cNvCxnSpPr>
+            <a:stCxn id="7" idx="5"/>
+          </p:cNvCxnSpPr>
+          <p:nvPr/>
+        </p:nvCxnSpPr>
+        <p:spPr>
+          <a:xfrm>
+            <a:off x="5322651" y="464727"/>
+            <a:ext cx="471757" cy="2009864"/>
+          </a:xfrm>
+          <a:prstGeom prst="line">
+            <a:avLst/>
+          </a:prstGeom>
+          <a:ln w="28575"/>
+        </p:spPr>
+        <p:style>
+          <a:lnRef idx="1">
+            <a:schemeClr val="accent1"/>
+          </a:lnRef>
+          <a:fillRef idx="0">
+            <a:schemeClr val="accent1"/>
+          </a:fillRef>
+          <a:effectRef idx="0">
+            <a:schemeClr val="accent1"/>
+          </a:effectRef>
+          <a:fontRef idx="minor">
+            <a:schemeClr val="tx1"/>
+          </a:fontRef>
+        </p:style>
+      </p:cxnSp>
+      <p:sp>
+        <p:nvSpPr>
+          <p:cNvPr id="15" name="TextBox 14"/>
+          <p:cNvSpPr txBox="1"/>
+          <p:nvPr/>
+        </p:nvSpPr>
+        <p:spPr>
+          <a:xfrm>
+            <a:off x="6500857" y="1998842"/>
+            <a:ext cx="1677062" cy="507831"/>
+          </a:xfrm>
+          <a:prstGeom prst="rect">
+            <a:avLst/>
+          </a:prstGeom>
+          <a:noFill/>
+        </p:spPr>
+        <p:txBody>
+          <a:bodyPr wrap="none" rtlCol="0">
+            <a:spAutoFit/>
+          </a:bodyPr>
+          <a:lstStyle/>
+          <a:p>
+            <a:r>
+              <a:rPr lang="en-US" dirty="0" smtClean="0"/>
+              <a:t>Upload-attachment</a:t>
+            </a:r>
+          </a:p>
+          <a:p>
+            <a:r>
+              <a:rPr lang="en-US" dirty="0" smtClean="0"/>
+              <a:t>after submit!</a:t>
+            </a:r>
+            <a:endParaRPr lang="en-US" dirty="0"/>
+          </a:p>
+        </p:txBody>
+      </p:sp>
+    </p:spTree>
+    <p:extLst>
+      <p:ext uri="{BB962C8B-B14F-4D97-AF65-F5344CB8AC3E}">
+        <p14:creationId xmlns:p14="http://schemas.microsoft.com/office/powerpoint/2010/main" val="597586319"/>
+      </p:ext>
+    </p:extLst>
+  </p:cSld>
+  <p:clrMapOvr>
+    <a:masterClrMapping/>
+  </p:clrMapOvr>
+</p:sld>
+</file>
+
+<file path=ppt/slides/slide8.xml><?xml version="1.0" encoding="utf-8"?>
+<p:sld xmlns:a="http://schemas.openxmlformats.org/drawingml/2006/main" xmlns:r="http://schemas.openxmlformats.org/officeDocument/2006/relationships" xmlns:p="http://schemas.openxmlformats.org/presentationml/2006/main">
+  <p:cSld>
+    <p:spTree>
+      <p:nvGrpSpPr>
+        <p:cNvPr id="1" name=""/>
+        <p:cNvGrpSpPr/>
+        <p:nvPr/>
+      </p:nvGrpSpPr>
+      <p:grpSpPr>
+        <a:xfrm>
+          <a:off x="0" y="0"/>
+          <a:ext cx="0" cy="0"/>
+          <a:chOff x="0" y="0"/>
+          <a:chExt cx="0" cy="0"/>
+        </a:xfrm>
+      </p:grpSpPr>
+      <p:pic>
+        <p:nvPicPr>
+          <p:cNvPr id="3074" name="Picture 2"/>
+          <p:cNvPicPr>
+            <a:picLocks noChangeAspect="1" noChangeArrowheads="1"/>
+          </p:cNvPicPr>
+          <p:nvPr/>
+        </p:nvPicPr>
+        <p:blipFill>
+          <a:blip r:embed="rId2">
+            <a:extLst>
+              <a:ext uri="{28A0092B-C50C-407E-A947-70E740481C1C}">
+                <a14:useLocalDpi xmlns:a14="http://schemas.microsoft.com/office/drawing/2010/main" val="0"/>
+              </a:ext>
+            </a:extLst>
+          </a:blip>
+          <a:srcRect/>
+          <a:stretch>
+            <a:fillRect/>
+          </a:stretch>
+        </p:blipFill>
+        <p:spPr bwMode="auto">
+          <a:xfrm>
+            <a:off x="0" y="5002"/>
+            <a:ext cx="6808510" cy="5138498"/>
+          </a:xfrm>
+          <a:prstGeom prst="rect">
+            <a:avLst/>
+          </a:prstGeom>
+          <a:noFill/>
+          <a:ln>
+            <a:noFill/>
+          </a:ln>
+          <a:extLst>
+            <a:ext uri="{909E8E84-426E-40DD-AFC4-6F175D3DCCD1}">
+              <a14:hiddenFill xmlns:a14="http://schemas.microsoft.com/office/drawing/2010/main">
+                <a:solidFill>
+                  <a:schemeClr val="accent1"/>
+                </a:solidFill>
+              </a14:hiddenFill>
+            </a:ext>
+            <a:ext uri="{91240B29-F687-4F45-9708-019B960494DF}">
+              <a14:hiddenLine xmlns:a14="http://schemas.microsoft.com/office/drawing/2010/main" w="9525">
+                <a:solidFill>
+                  <a:schemeClr val="tx1"/>
+                </a:solidFill>
+                <a:miter lim="800000"/>
+                <a:headEnd/>
+                <a:tailEnd/>
+              </a14:hiddenLine>
+            </a:ext>
+          </a:extLst>
+        </p:spPr>
+      </p:pic>
+      <p:sp>
+        <p:nvSpPr>
+          <p:cNvPr id="4" name="TextBox 3"/>
+          <p:cNvSpPr txBox="1"/>
+          <p:nvPr/>
+        </p:nvSpPr>
+        <p:spPr>
+          <a:xfrm>
+            <a:off x="6949440" y="1626668"/>
+            <a:ext cx="1925053" cy="715581"/>
+          </a:xfrm>
+          <a:prstGeom prst="rect">
+            <a:avLst/>
+          </a:prstGeom>
+          <a:noFill/>
+        </p:spPr>
+        <p:txBody>
+          <a:bodyPr wrap="square" rtlCol="0">
+            <a:spAutoFit/>
+          </a:bodyPr>
+          <a:lstStyle/>
+          <a:p>
+            <a:r>
+              <a:rPr lang="en-US" dirty="0" err="1" smtClean="0"/>
+              <a:t>Käsittelijä</a:t>
+            </a:r>
+            <a:r>
+              <a:rPr lang="en-US" dirty="0" smtClean="0"/>
+              <a:t> </a:t>
+            </a:r>
+            <a:r>
+              <a:rPr lang="en-US" dirty="0" err="1" smtClean="0"/>
+              <a:t>käy</a:t>
+            </a:r>
+            <a:r>
+              <a:rPr lang="en-US" dirty="0" smtClean="0"/>
+              <a:t> </a:t>
+            </a:r>
+            <a:r>
+              <a:rPr lang="en-US" dirty="0" err="1" smtClean="0"/>
+              <a:t>naapurisodan</a:t>
+            </a:r>
+            <a:r>
+              <a:rPr lang="en-US" dirty="0" smtClean="0"/>
+              <a:t> </a:t>
+            </a:r>
+            <a:r>
+              <a:rPr lang="en-US" dirty="0" err="1" smtClean="0"/>
+              <a:t>hakijan</a:t>
+            </a:r>
+            <a:r>
+              <a:rPr lang="en-US" dirty="0" smtClean="0"/>
+              <a:t> </a:t>
+            </a:r>
+            <a:r>
+              <a:rPr lang="en-US" dirty="0" err="1" smtClean="0"/>
+              <a:t>puolesta</a:t>
+            </a:r>
+            <a:r>
+              <a:rPr lang="en-US" dirty="0" smtClean="0"/>
+              <a:t>..?</a:t>
+            </a:r>
+            <a:endParaRPr lang="en-US" dirty="0"/>
+          </a:p>
+        </p:txBody>
+      </p:sp>
+    </p:spTree>
+    <p:extLst>
+      <p:ext uri="{BB962C8B-B14F-4D97-AF65-F5344CB8AC3E}">
+        <p14:creationId xmlns:p14="http://schemas.microsoft.com/office/powerpoint/2010/main" val="3189056106"/>
+      </p:ext>
+    </p:extLst>
+  </p:cSld>
+  <p:clrMapOvr>
+    <a:masterClrMapping/>
+  </p:clrMapOvr>
+</p:sld>
+</file>
+
+<file path=ppt/slides/slide9.xml><?xml version="1.0" encoding="utf-8"?>
+<p:sld xmlns:a="http://schemas.openxmlformats.org/drawingml/2006/main" xmlns:r="http://schemas.openxmlformats.org/officeDocument/2006/relationships" xmlns:p="http://schemas.openxmlformats.org/presentationml/2006/main">
+  <p:cSld>
+    <p:spTree>
+      <p:nvGrpSpPr>
+        <p:cNvPr id="1" name=""/>
+        <p:cNvGrpSpPr/>
+        <p:nvPr/>
+      </p:nvGrpSpPr>
+      <p:grpSpPr>
+        <a:xfrm>
+          <a:off x="0" y="0"/>
+          <a:ext cx="0" cy="0"/>
+          <a:chOff x="0" y="0"/>
+          <a:chExt cx="0" cy="0"/>
+        </a:xfrm>
+      </p:grpSpPr>
+      <p:pic>
+        <p:nvPicPr>
+          <p:cNvPr id="4098" name="Picture 2"/>
+          <p:cNvPicPr>
+            <a:picLocks noChangeAspect="1" noChangeArrowheads="1"/>
+          </p:cNvPicPr>
+          <p:nvPr/>
+        </p:nvPicPr>
+        <p:blipFill>
+          <a:blip r:embed="rId2">
+            <a:extLst>
+              <a:ext uri="{28A0092B-C50C-407E-A947-70E740481C1C}">
+                <a14:useLocalDpi xmlns:a14="http://schemas.microsoft.com/office/drawing/2010/main" val="0"/>
+              </a:ext>
+            </a:extLst>
+          </a:blip>
+          <a:srcRect/>
+          <a:stretch>
+            <a:fillRect/>
+          </a:stretch>
+        </p:blipFill>
+        <p:spPr bwMode="auto">
+          <a:xfrm>
+            <a:off x="192504" y="159958"/>
+            <a:ext cx="6738687" cy="4297040"/>
+          </a:xfrm>
+          <a:prstGeom prst="rect">
+            <a:avLst/>
+          </a:prstGeom>
+          <a:noFill/>
+          <a:ln>
+            <a:noFill/>
+          </a:ln>
+          <a:extLst>
+            <a:ext uri="{909E8E84-426E-40DD-AFC4-6F175D3DCCD1}">
+              <a14:hiddenFill xmlns:a14="http://schemas.microsoft.com/office/drawing/2010/main">
+                <a:solidFill>
+                  <a:schemeClr val="accent1"/>
+                </a:solidFill>
+              </a14:hiddenFill>
+            </a:ext>
+            <a:ext uri="{91240B29-F687-4F45-9708-019B960494DF}">
+              <a14:hiddenLine xmlns:a14="http://schemas.microsoft.com/office/drawing/2010/main" w="9525">
+                <a:solidFill>
+                  <a:schemeClr val="tx1"/>
+                </a:solidFill>
+                <a:miter lim="800000"/>
+                <a:headEnd/>
+                <a:tailEnd/>
+              </a14:hiddenLine>
+            </a:ext>
+          </a:extLst>
+        </p:spPr>
+      </p:pic>
+      <p:sp>
+        <p:nvSpPr>
+          <p:cNvPr id="4" name="TextBox 3"/>
+          <p:cNvSpPr txBox="1"/>
+          <p:nvPr/>
+        </p:nvSpPr>
+        <p:spPr>
+          <a:xfrm>
+            <a:off x="6931191" y="427475"/>
+            <a:ext cx="2140330" cy="300082"/>
+          </a:xfrm>
+          <a:prstGeom prst="rect">
+            <a:avLst/>
+          </a:prstGeom>
+          <a:noFill/>
+        </p:spPr>
+        <p:txBody>
+          <a:bodyPr wrap="none" rtlCol="0">
+            <a:spAutoFit/>
+          </a:bodyPr>
+          <a:lstStyle/>
+          <a:p>
+            <a:r>
+              <a:rPr lang="en-US" dirty="0" err="1" smtClean="0"/>
+              <a:t>Uusi</a:t>
+            </a:r>
+            <a:r>
+              <a:rPr lang="en-US" dirty="0" smtClean="0"/>
+              <a:t> “</a:t>
+            </a:r>
+            <a:r>
+              <a:rPr lang="en-US" dirty="0" err="1" smtClean="0"/>
+              <a:t>kirjoittaja</a:t>
+            </a:r>
+            <a:r>
+              <a:rPr lang="en-US" dirty="0" smtClean="0"/>
+              <a:t>” </a:t>
+            </a:r>
+            <a:r>
+              <a:rPr lang="en-US" dirty="0" err="1" smtClean="0"/>
+              <a:t>mukaan</a:t>
+            </a:r>
+            <a:endParaRPr lang="en-US" dirty="0"/>
+          </a:p>
+        </p:txBody>
+      </p:sp>
+      <p:sp>
+        <p:nvSpPr>
+          <p:cNvPr id="5" name="TextBox 4"/>
+          <p:cNvSpPr txBox="1"/>
+          <p:nvPr/>
+        </p:nvSpPr>
+        <p:spPr>
+          <a:xfrm>
+            <a:off x="7209323" y="2164098"/>
+            <a:ext cx="1386038" cy="715581"/>
+          </a:xfrm>
+          <a:prstGeom prst="rect">
+            <a:avLst/>
+          </a:prstGeom>
+          <a:noFill/>
+        </p:spPr>
+        <p:txBody>
+          <a:bodyPr wrap="square" rtlCol="0">
+            <a:spAutoFit/>
+          </a:bodyPr>
+          <a:lstStyle/>
+          <a:p>
+            <a:r>
+              <a:rPr lang="en-US" dirty="0" err="1" smtClean="0"/>
+              <a:t>Ensimmäinen</a:t>
+            </a:r>
+            <a:r>
+              <a:rPr lang="en-US" dirty="0" smtClean="0"/>
+              <a:t> </a:t>
+            </a:r>
+            <a:r>
+              <a:rPr lang="en-US" dirty="0" err="1" smtClean="0"/>
+              <a:t>maininta</a:t>
+            </a:r>
+            <a:r>
+              <a:rPr lang="en-US" dirty="0" smtClean="0"/>
+              <a:t> </a:t>
+            </a:r>
+            <a:r>
+              <a:rPr lang="en-US" dirty="0" err="1" smtClean="0"/>
+              <a:t>päätöksestä</a:t>
+            </a:r>
+            <a:endParaRPr lang="en-US" dirty="0"/>
+          </a:p>
+        </p:txBody>
+      </p:sp>
+      <p:cxnSp>
+        <p:nvCxnSpPr>
+          <p:cNvPr id="7" name="Straight Connector 6"/>
+          <p:cNvCxnSpPr/>
+          <p:nvPr/>
+        </p:nvCxnSpPr>
+        <p:spPr>
+          <a:xfrm flipH="1" flipV="1">
+            <a:off x="6862813" y="1424539"/>
+            <a:ext cx="818147" cy="664143"/>
+          </a:xfrm>
+          <a:prstGeom prst="line">
+            <a:avLst/>
+          </a:prstGeom>
+          <a:ln w="28575"/>
+        </p:spPr>
+        <p:style>
+          <a:lnRef idx="1">
+            <a:schemeClr val="accent1"/>
+          </a:lnRef>
+          <a:fillRef idx="0">
+            <a:schemeClr val="accent1"/>
+          </a:fillRef>
+          <a:effectRef idx="0">
+            <a:schemeClr val="accent1"/>
+          </a:effectRef>
+          <a:fontRef idx="minor">
+            <a:schemeClr val="tx1"/>
+          </a:fontRef>
+        </p:style>
+      </p:cxnSp>
+    </p:spTree>
+    <p:extLst>
+      <p:ext uri="{BB962C8B-B14F-4D97-AF65-F5344CB8AC3E}">
+        <p14:creationId xmlns:p14="http://schemas.microsoft.com/office/powerpoint/2010/main" val="1775422754"/>
+      </p:ext>
+    </p:extLst>
+  </p:cSld>
+  <p:clrMapOvr>
+    <a:masterClrMapping/>
+  </p:clrMapOvr>
 </p:sld>
 </file>
 
@@ -7183,7 +8582,7 @@
   <a:extraClrSchemeLst/>
   <a:extLst>
     <a:ext uri="{05A4C25C-085E-4340-85A3-A5531E510DB2}">
-      <thm15:themeFamily xmlns:thm15="http://schemas.microsoft.com/office/thememl/2012/main" name="Esitys2" id="{0E85DFF2-2597-4B81-A3F2-3717336D14D7}" vid="{341D2143-4511-4F6C-BB99-566375251572}"/>
+      <thm15:themeFamily xmlns:thm15="http://schemas.microsoft.com/office/thememl/2012/main" xmlns="" name="Esitys2" id="{0E85DFF2-2597-4B81-A3F2-3717336D14D7}" vid="{341D2143-4511-4F6C-BB99-566375251572}"/>
     </a:ext>
   </a:extLst>
 </a:theme>

</xml_diff>